<commit_message>
Updated notes with actvity guide for Terraform and Ansible added
</commit_message>
<xml_diff>
--- a/AWS/AWS_Core_Architecture&Security.pptx
+++ b/AWS/AWS_Core_Architecture&Security.pptx
@@ -5495,6 +5495,104 @@
           </a:prstGeom>
         </p:spPr>
       </p:pic>
+      <p:sp>
+        <p:nvSpPr>
+          <p:cNvPr id="4" name="Rectangle 3">
+            <a:extLst>
+              <a:ext uri="{FF2B5EF4-FFF2-40B4-BE49-F238E27FC236}">
+                <a16:creationId xmlns:a16="http://schemas.microsoft.com/office/drawing/2014/main" id="{F8736CF8-B2E1-8903-65F4-9AD5F6765BCD}"/>
+              </a:ext>
+            </a:extLst>
+          </p:cNvPr>
+          <p:cNvSpPr/>
+          <p:nvPr/>
+        </p:nvSpPr>
+        <p:spPr>
+          <a:xfrm>
+            <a:off x="4470400" y="4273550"/>
+            <a:ext cx="1104900" cy="615950"/>
+          </a:xfrm>
+          <a:prstGeom prst="rect">
+            <a:avLst/>
+          </a:prstGeom>
+        </p:spPr>
+        <p:style>
+          <a:lnRef idx="2">
+            <a:schemeClr val="accent1">
+              <a:shade val="15000"/>
+            </a:schemeClr>
+          </a:lnRef>
+          <a:fillRef idx="1">
+            <a:schemeClr val="accent1"/>
+          </a:fillRef>
+          <a:effectRef idx="0">
+            <a:schemeClr val="accent1"/>
+          </a:effectRef>
+          <a:fontRef idx="minor">
+            <a:schemeClr val="lt1"/>
+          </a:fontRef>
+        </p:style>
+        <p:txBody>
+          <a:bodyPr rtlCol="0" anchor="ctr"/>
+          <a:lstStyle/>
+          <a:p>
+            <a:pPr algn="ctr"/>
+            <a:r>
+              <a:rPr lang="en-IN" sz="1000" dirty="0"/>
+              <a:t>Jump / bastion Host</a:t>
+            </a:r>
+          </a:p>
+        </p:txBody>
+      </p:sp>
+      <p:sp>
+        <p:nvSpPr>
+          <p:cNvPr id="5" name="Rectangle 4">
+            <a:extLst>
+              <a:ext uri="{FF2B5EF4-FFF2-40B4-BE49-F238E27FC236}">
+                <a16:creationId xmlns:a16="http://schemas.microsoft.com/office/drawing/2014/main" id="{E6A19B8B-9C62-A49B-90EF-AADD7088D203}"/>
+              </a:ext>
+            </a:extLst>
+          </p:cNvPr>
+          <p:cNvSpPr/>
+          <p:nvPr/>
+        </p:nvSpPr>
+        <p:spPr>
+          <a:xfrm>
+            <a:off x="9152618" y="4581525"/>
+            <a:ext cx="704850" cy="488950"/>
+          </a:xfrm>
+          <a:prstGeom prst="rect">
+            <a:avLst/>
+          </a:prstGeom>
+        </p:spPr>
+        <p:style>
+          <a:lnRef idx="2">
+            <a:schemeClr val="accent1">
+              <a:shade val="15000"/>
+            </a:schemeClr>
+          </a:lnRef>
+          <a:fillRef idx="1">
+            <a:schemeClr val="accent1"/>
+          </a:fillRef>
+          <a:effectRef idx="0">
+            <a:schemeClr val="accent1"/>
+          </a:effectRef>
+          <a:fontRef idx="minor">
+            <a:schemeClr val="lt1"/>
+          </a:fontRef>
+        </p:style>
+        <p:txBody>
+          <a:bodyPr rtlCol="0" anchor="ctr"/>
+          <a:lstStyle/>
+          <a:p>
+            <a:pPr algn="ctr"/>
+            <a:r>
+              <a:rPr lang="en-IN" sz="1200" dirty="0"/>
+              <a:t>Laptop</a:t>
+            </a:r>
+          </a:p>
+        </p:txBody>
+      </p:sp>
     </p:spTree>
     <p:extLst>
       <p:ext uri="{BB962C8B-B14F-4D97-AF65-F5344CB8AC3E}">
@@ -6757,7 +6855,7 @@
           <p:nvPr>
             <p:extLst>
               <p:ext uri="{D42A27DB-BD31-4B8C-83A1-F6EECF244321}">
-                <p14:modId xmlns:p14="http://schemas.microsoft.com/office/powerpoint/2010/main" val="2622543196"/>
+                <p14:modId xmlns:p14="http://schemas.microsoft.com/office/powerpoint/2010/main" val="4163111077"/>
               </p:ext>
             </p:extLst>
           </p:nvPr>
@@ -7142,7 +7240,10 @@
                     <a:bodyPr/>
                     <a:lstStyle/>
                     <a:p>
-                      <a:endParaRPr lang="en-IN" dirty="0"/>
+                      <a:r>
+                        <a:rPr lang="en-IN" dirty="0"/>
+                        <a:t>yes</a:t>
+                      </a:r>
                     </a:p>
                   </a:txBody>
                   <a:tcPr anchor="ctr">
@@ -7344,7 +7445,7 @@
                     <a:bodyPr/>
                     <a:lstStyle/>
                     <a:p>
-                      <a:endParaRPr lang="en-IN"/>
+                      <a:endParaRPr lang="en-IN" dirty="0"/>
                     </a:p>
                   </a:txBody>
                   <a:tcPr anchor="ctr">
@@ -7391,7 +7492,10 @@
                     <a:bodyPr/>
                     <a:lstStyle/>
                     <a:p>
-                      <a:endParaRPr lang="en-IN" dirty="0"/>
+                      <a:r>
+                        <a:rPr lang="en-IN" dirty="0"/>
+                        <a:t>yes</a:t>
+                      </a:r>
                     </a:p>
                   </a:txBody>
                   <a:tcPr anchor="ctr">
@@ -7546,7 +7650,10 @@
                     <a:bodyPr/>
                     <a:lstStyle/>
                     <a:p>
-                      <a:endParaRPr lang="en-IN"/>
+                      <a:r>
+                        <a:rPr lang="en-IN" dirty="0"/>
+                        <a:t>yes</a:t>
+                      </a:r>
                     </a:p>
                   </a:txBody>
                   <a:tcPr anchor="ctr">
@@ -7795,7 +7902,10 @@
                     <a:bodyPr/>
                     <a:lstStyle/>
                     <a:p>
-                      <a:endParaRPr lang="en-IN" dirty="0"/>
+                      <a:r>
+                        <a:rPr lang="en-IN" dirty="0"/>
+                        <a:t>yes</a:t>
+                      </a:r>
                     </a:p>
                   </a:txBody>
                   <a:tcPr anchor="ctr">
@@ -8044,7 +8154,10 @@
                     <a:bodyPr/>
                     <a:lstStyle/>
                     <a:p>
-                      <a:endParaRPr lang="en-IN" dirty="0"/>
+                      <a:r>
+                        <a:rPr lang="en-IN" dirty="0"/>
+                        <a:t>yes</a:t>
+                      </a:r>
                     </a:p>
                   </a:txBody>
                   <a:tcPr anchor="ctr">
@@ -8199,7 +8312,10 @@
                     <a:bodyPr/>
                     <a:lstStyle/>
                     <a:p>
-                      <a:endParaRPr lang="en-IN" dirty="0"/>
+                      <a:r>
+                        <a:rPr lang="en-IN" dirty="0"/>
+                        <a:t>yes</a:t>
+                      </a:r>
                     </a:p>
                   </a:txBody>
                   <a:tcPr anchor="ctr">
@@ -13278,8 +13394,8 @@
         </p:nvSpPr>
         <p:spPr>
           <a:xfrm>
-            <a:off x="903517" y="4461260"/>
-            <a:ext cx="3897084" cy="1980029"/>
+            <a:off x="903516" y="4587672"/>
+            <a:ext cx="7307796" cy="1733808"/>
           </a:xfrm>
           <a:prstGeom prst="rect">
             <a:avLst/>
@@ -13304,7 +13420,7 @@
             </a:pPr>
             <a:r>
               <a:rPr lang="en-US" sz="1600" b="1" dirty="0"/>
-              <a:t>📍 3. CDN endpoints for CloudFront</a:t>
+              <a:t>📍 3. Edge Locations / CDN (Content Delivery Network) endpoints for CloudFront</a:t>
             </a:r>
           </a:p>
           <a:p>
@@ -13378,8 +13494,6 @@
               <a:rPr lang="en-US" sz="1600" dirty="0"/>
               <a:t>Separate from Regions and AZs</a:t>
             </a:r>
-          </a:p>
-          <a:p>
             <a:endParaRPr lang="en-IN" sz="1600" dirty="0"/>
           </a:p>
         </p:txBody>
@@ -20658,8 +20772,12 @@
               <a:buChar char="•"/>
             </a:pPr>
             <a:r>
-              <a:rPr lang="en-US" sz="1600" dirty="0"/>
-              <a:t>Quick Check: Do pricing comparison for EC2 instances in North Virginia vs Mumbai</a:t>
+              <a:rPr lang="en-US" sz="1600" b="1" dirty="0"/>
+              <a:t>Quick Check: </a:t>
+            </a:r>
+            <a:r>
+              <a:rPr lang="en-US" sz="1600" dirty="0"/>
+              <a:t>Do pricing comparison for EC2 instances in North Virginia vs Mumbai</a:t>
             </a:r>
           </a:p>
         </p:txBody>
@@ -21995,7 +22113,7 @@
         <p:spPr>
           <a:xfrm>
             <a:off x="794657" y="1151709"/>
-            <a:ext cx="10450285" cy="4626908"/>
+            <a:ext cx="10450285" cy="5119350"/>
           </a:xfrm>
           <a:prstGeom prst="rect">
             <a:avLst/>
@@ -22073,9 +22191,28 @@
             </a:r>
           </a:p>
           <a:p>
-            <a:r>
-              <a:rPr lang="en-US" sz="1600" b="1" dirty="0"/>
-              <a:t>1. Why do some Regions have more AZs than others?</a:t>
+            <a:pPr marL="342900" indent="-342900">
+              <a:buAutoNum type="arabicPeriod"/>
+            </a:pPr>
+            <a:r>
+              <a:rPr lang="en-US" sz="1600" b="1" dirty="0"/>
+              <a:t>Why do some Regions have more AZs than others?</a:t>
+            </a:r>
+          </a:p>
+          <a:p>
+            <a:r>
+              <a:rPr lang="en-US" sz="1600" b="1" dirty="0"/>
+              <a:t>Ans: - </a:t>
+            </a:r>
+            <a:r>
+              <a:rPr lang="en-US" sz="1600" dirty="0"/>
+              <a:t>Customer Demand -&gt; you would need more workload to be running on us-east-1, more infra</a:t>
+            </a:r>
+          </a:p>
+          <a:p>
+            <a:r>
+              <a:rPr lang="en-US" sz="1600" dirty="0"/>
+              <a:t>Cost low -&gt; more customer demand</a:t>
             </a:r>
             <a:br>
               <a:rPr lang="en-US" sz="1600" dirty="0"/>
@@ -22173,7 +22310,15 @@
             </a:r>
             <a:r>
               <a:rPr lang="en-US" sz="1600" b="1" dirty="0"/>
-              <a:t>EC2, RDS, S3, Lambda</a:t>
+              <a:t>EC2, RDS, S3, Lambda (but we will include </a:t>
+            </a:r>
+            <a:r>
+              <a:rPr lang="en-US" sz="1600" b="1" dirty="0" err="1"/>
+              <a:t>cloudfront</a:t>
+            </a:r>
+            <a:r>
+              <a:rPr lang="en-US" sz="1600" b="1" dirty="0"/>
+              <a:t> for CDN as well)</a:t>
             </a:r>
             <a:endParaRPr lang="en-US" sz="1600" dirty="0"/>
           </a:p>

</xml_diff>

<commit_message>
updated notes with activity guides
</commit_message>
<xml_diff>
--- a/AWS/AWS_Core_Architecture&Security.pptx
+++ b/AWS/AWS_Core_Architecture&Security.pptx
@@ -5,7 +5,7 @@
     <p:sldMasterId id="2147483648" r:id="rId1"/>
   </p:sldMasterIdLst>
   <p:notesMasterIdLst>
-    <p:notesMasterId r:id="rId54"/>
+    <p:notesMasterId r:id="rId55"/>
   </p:notesMasterIdLst>
   <p:sldIdLst>
     <p:sldId id="257" r:id="rId2"/>
@@ -38,28 +38,29 @@
     <p:sldId id="279" r:id="rId29"/>
     <p:sldId id="280" r:id="rId30"/>
     <p:sldId id="281" r:id="rId31"/>
-    <p:sldId id="282" r:id="rId32"/>
-    <p:sldId id="283" r:id="rId33"/>
-    <p:sldId id="304" r:id="rId34"/>
-    <p:sldId id="305" r:id="rId35"/>
-    <p:sldId id="306" r:id="rId36"/>
-    <p:sldId id="308" r:id="rId37"/>
-    <p:sldId id="323" r:id="rId38"/>
-    <p:sldId id="285" r:id="rId39"/>
-    <p:sldId id="307" r:id="rId40"/>
-    <p:sldId id="309" r:id="rId41"/>
-    <p:sldId id="286" r:id="rId42"/>
-    <p:sldId id="324" r:id="rId43"/>
-    <p:sldId id="287" r:id="rId44"/>
-    <p:sldId id="310" r:id="rId45"/>
-    <p:sldId id="289" r:id="rId46"/>
-    <p:sldId id="288" r:id="rId47"/>
-    <p:sldId id="311" r:id="rId48"/>
-    <p:sldId id="291" r:id="rId49"/>
-    <p:sldId id="290" r:id="rId50"/>
-    <p:sldId id="292" r:id="rId51"/>
-    <p:sldId id="293" r:id="rId52"/>
-    <p:sldId id="295" r:id="rId53"/>
+    <p:sldId id="325" r:id="rId32"/>
+    <p:sldId id="282" r:id="rId33"/>
+    <p:sldId id="283" r:id="rId34"/>
+    <p:sldId id="304" r:id="rId35"/>
+    <p:sldId id="305" r:id="rId36"/>
+    <p:sldId id="306" r:id="rId37"/>
+    <p:sldId id="308" r:id="rId38"/>
+    <p:sldId id="323" r:id="rId39"/>
+    <p:sldId id="285" r:id="rId40"/>
+    <p:sldId id="307" r:id="rId41"/>
+    <p:sldId id="309" r:id="rId42"/>
+    <p:sldId id="286" r:id="rId43"/>
+    <p:sldId id="324" r:id="rId44"/>
+    <p:sldId id="287" r:id="rId45"/>
+    <p:sldId id="310" r:id="rId46"/>
+    <p:sldId id="289" r:id="rId47"/>
+    <p:sldId id="288" r:id="rId48"/>
+    <p:sldId id="311" r:id="rId49"/>
+    <p:sldId id="291" r:id="rId50"/>
+    <p:sldId id="290" r:id="rId51"/>
+    <p:sldId id="292" r:id="rId52"/>
+    <p:sldId id="293" r:id="rId53"/>
+    <p:sldId id="295" r:id="rId54"/>
   </p:sldIdLst>
   <p:sldSz cx="12192000" cy="6858000"/>
   <p:notesSz cx="6858000" cy="9144000"/>
@@ -248,7 +249,7 @@
           <a:p>
             <a:fld id="{34C307C2-D910-4122-9388-FE9DC4B9E077}" type="datetimeFigureOut">
               <a:rPr lang="en-IN" smtClean="0"/>
-              <a:t>29-11-2025</a:t>
+              <a:t>30-11-2025</a:t>
             </a:fld>
             <a:endParaRPr lang="en-IN"/>
           </a:p>
@@ -1073,7 +1074,7 @@
           <a:p>
             <a:fld id="{80B77DFC-8711-4557-8CA1-4C836922276B}" type="datetimeFigureOut">
               <a:rPr lang="en-IN" smtClean="0"/>
-              <a:t>29-11-2025</a:t>
+              <a:t>30-11-2025</a:t>
             </a:fld>
             <a:endParaRPr lang="en-IN"/>
           </a:p>
@@ -1273,7 +1274,7 @@
           <a:p>
             <a:fld id="{80B77DFC-8711-4557-8CA1-4C836922276B}" type="datetimeFigureOut">
               <a:rPr lang="en-IN" smtClean="0"/>
-              <a:t>29-11-2025</a:t>
+              <a:t>30-11-2025</a:t>
             </a:fld>
             <a:endParaRPr lang="en-IN"/>
           </a:p>
@@ -1483,7 +1484,7 @@
           <a:p>
             <a:fld id="{80B77DFC-8711-4557-8CA1-4C836922276B}" type="datetimeFigureOut">
               <a:rPr lang="en-IN" smtClean="0"/>
-              <a:t>29-11-2025</a:t>
+              <a:t>30-11-2025</a:t>
             </a:fld>
             <a:endParaRPr lang="en-IN"/>
           </a:p>
@@ -1683,7 +1684,7 @@
           <a:p>
             <a:fld id="{80B77DFC-8711-4557-8CA1-4C836922276B}" type="datetimeFigureOut">
               <a:rPr lang="en-IN" smtClean="0"/>
-              <a:t>29-11-2025</a:t>
+              <a:t>30-11-2025</a:t>
             </a:fld>
             <a:endParaRPr lang="en-IN"/>
           </a:p>
@@ -1959,7 +1960,7 @@
           <a:p>
             <a:fld id="{80B77DFC-8711-4557-8CA1-4C836922276B}" type="datetimeFigureOut">
               <a:rPr lang="en-IN" smtClean="0"/>
-              <a:t>29-11-2025</a:t>
+              <a:t>30-11-2025</a:t>
             </a:fld>
             <a:endParaRPr lang="en-IN"/>
           </a:p>
@@ -2227,7 +2228,7 @@
           <a:p>
             <a:fld id="{80B77DFC-8711-4557-8CA1-4C836922276B}" type="datetimeFigureOut">
               <a:rPr lang="en-IN" smtClean="0"/>
-              <a:t>29-11-2025</a:t>
+              <a:t>30-11-2025</a:t>
             </a:fld>
             <a:endParaRPr lang="en-IN"/>
           </a:p>
@@ -2642,7 +2643,7 @@
           <a:p>
             <a:fld id="{80B77DFC-8711-4557-8CA1-4C836922276B}" type="datetimeFigureOut">
               <a:rPr lang="en-IN" smtClean="0"/>
-              <a:t>29-11-2025</a:t>
+              <a:t>30-11-2025</a:t>
             </a:fld>
             <a:endParaRPr lang="en-IN"/>
           </a:p>
@@ -2784,7 +2785,7 @@
           <a:p>
             <a:fld id="{80B77DFC-8711-4557-8CA1-4C836922276B}" type="datetimeFigureOut">
               <a:rPr lang="en-IN" smtClean="0"/>
-              <a:t>29-11-2025</a:t>
+              <a:t>30-11-2025</a:t>
             </a:fld>
             <a:endParaRPr lang="en-IN"/>
           </a:p>
@@ -2897,7 +2898,7 @@
           <a:p>
             <a:fld id="{80B77DFC-8711-4557-8CA1-4C836922276B}" type="datetimeFigureOut">
               <a:rPr lang="en-IN" smtClean="0"/>
-              <a:t>29-11-2025</a:t>
+              <a:t>30-11-2025</a:t>
             </a:fld>
             <a:endParaRPr lang="en-IN"/>
           </a:p>
@@ -3210,7 +3211,7 @@
           <a:p>
             <a:fld id="{80B77DFC-8711-4557-8CA1-4C836922276B}" type="datetimeFigureOut">
               <a:rPr lang="en-IN" smtClean="0"/>
-              <a:t>29-11-2025</a:t>
+              <a:t>30-11-2025</a:t>
             </a:fld>
             <a:endParaRPr lang="en-IN"/>
           </a:p>
@@ -3499,7 +3500,7 @@
           <a:p>
             <a:fld id="{80B77DFC-8711-4557-8CA1-4C836922276B}" type="datetimeFigureOut">
               <a:rPr lang="en-IN" smtClean="0"/>
-              <a:t>29-11-2025</a:t>
+              <a:t>30-11-2025</a:t>
             </a:fld>
             <a:endParaRPr lang="en-IN"/>
           </a:p>
@@ -3742,7 +3743,7 @@
           <a:p>
             <a:fld id="{80B77DFC-8711-4557-8CA1-4C836922276B}" type="datetimeFigureOut">
               <a:rPr lang="en-IN" smtClean="0"/>
-              <a:t>29-11-2025</a:t>
+              <a:t>30-11-2025</a:t>
             </a:fld>
             <a:endParaRPr lang="en-IN"/>
           </a:p>
@@ -13793,7 +13794,7 @@
             </a:r>
             <a:r>
               <a:rPr lang="en-US" sz="1600" dirty="0"/>
-              <a:t> (no password, no access keys)</a:t>
+              <a:t> (no password, short term access keys)</a:t>
             </a:r>
           </a:p>
           <a:p>
@@ -14004,6 +14005,122 @@
 </file>
 
 <file path=ppt/slides/slide31.xml><?xml version="1.0" encoding="utf-8"?>
+<p:sld xmlns:a="http://schemas.openxmlformats.org/drawingml/2006/main" xmlns:r="http://schemas.openxmlformats.org/officeDocument/2006/relationships" xmlns:p="http://schemas.openxmlformats.org/presentationml/2006/main">
+  <p:cSld>
+    <p:spTree>
+      <p:nvGrpSpPr>
+        <p:cNvPr id="1" name="">
+          <a:extLst>
+            <a:ext uri="{FF2B5EF4-FFF2-40B4-BE49-F238E27FC236}">
+              <a16:creationId xmlns:a16="http://schemas.microsoft.com/office/drawing/2014/main" id="{322E5BFE-0DB7-45C4-F231-6AE81C312793}"/>
+            </a:ext>
+          </a:extLst>
+        </p:cNvPr>
+        <p:cNvGrpSpPr/>
+        <p:nvPr/>
+      </p:nvGrpSpPr>
+      <p:grpSpPr>
+        <a:xfrm>
+          <a:off x="0" y="0"/>
+          <a:ext cx="0" cy="0"/>
+          <a:chOff x="0" y="0"/>
+          <a:chExt cx="0" cy="0"/>
+        </a:xfrm>
+      </p:grpSpPr>
+      <p:sp>
+        <p:nvSpPr>
+          <p:cNvPr id="2" name="TextBox 1">
+            <a:extLst>
+              <a:ext uri="{FF2B5EF4-FFF2-40B4-BE49-F238E27FC236}">
+                <a16:creationId xmlns:a16="http://schemas.microsoft.com/office/drawing/2014/main" id="{33B85DFE-5AEE-4BB6-2015-2169D1F3EA61}"/>
+              </a:ext>
+            </a:extLst>
+          </p:cNvPr>
+          <p:cNvSpPr txBox="1"/>
+          <p:nvPr/>
+        </p:nvSpPr>
+        <p:spPr>
+          <a:xfrm>
+            <a:off x="906449" y="262393"/>
+            <a:ext cx="5768469" cy="646331"/>
+          </a:xfrm>
+          <a:prstGeom prst="rect">
+            <a:avLst/>
+          </a:prstGeom>
+          <a:noFill/>
+        </p:spPr>
+        <p:txBody>
+          <a:bodyPr wrap="square">
+            <a:spAutoFit/>
+          </a:bodyPr>
+          <a:lstStyle/>
+          <a:p>
+            <a:pPr>
+              <a:defRPr sz="3600" b="1">
+                <a:solidFill>
+                  <a:srgbClr val="232F3E"/>
+                </a:solidFill>
+              </a:defRPr>
+            </a:pPr>
+            <a:r>
+              <a:rPr sz="3600" dirty="0"/>
+              <a:t>IAM </a:t>
+            </a:r>
+            <a:r>
+              <a:rPr lang="en-IN" sz="3600" dirty="0"/>
+              <a:t>Cross Account </a:t>
+            </a:r>
+            <a:r>
+              <a:rPr sz="3600" dirty="0"/>
+              <a:t>Roles</a:t>
+            </a:r>
+          </a:p>
+        </p:txBody>
+      </p:sp>
+      <p:pic>
+        <p:nvPicPr>
+          <p:cNvPr id="5" name="Picture 4">
+            <a:extLst>
+              <a:ext uri="{FF2B5EF4-FFF2-40B4-BE49-F238E27FC236}">
+                <a16:creationId xmlns:a16="http://schemas.microsoft.com/office/drawing/2014/main" id="{D041E28E-8074-623C-DD1C-FE860246FC8E}"/>
+              </a:ext>
+            </a:extLst>
+          </p:cNvPr>
+          <p:cNvPicPr>
+            <a:picLocks noChangeAspect="1"/>
+          </p:cNvPicPr>
+          <p:nvPr/>
+        </p:nvPicPr>
+        <p:blipFill>
+          <a:blip r:embed="rId2"/>
+          <a:stretch>
+            <a:fillRect/>
+          </a:stretch>
+        </p:blipFill>
+        <p:spPr>
+          <a:xfrm>
+            <a:off x="1071170" y="1341926"/>
+            <a:ext cx="6121715" cy="2997354"/>
+          </a:xfrm>
+          <a:prstGeom prst="rect">
+            <a:avLst/>
+          </a:prstGeom>
+        </p:spPr>
+      </p:pic>
+    </p:spTree>
+    <p:extLst>
+      <p:ext uri="{BB962C8B-B14F-4D97-AF65-F5344CB8AC3E}">
+        <p14:creationId xmlns:p14="http://schemas.microsoft.com/office/powerpoint/2010/main" val="3414223643"/>
+      </p:ext>
+    </p:extLst>
+  </p:cSld>
+  <p:clrMapOvr>
+    <a:masterClrMapping/>
+  </p:clrMapOvr>
+</p:sld>
+</file>
+
+<file path=ppt/slides/slide32.xml><?xml version="1.0" encoding="utf-8"?>
 <p:sld xmlns:a="http://schemas.openxmlformats.org/drawingml/2006/main" xmlns:r="http://schemas.openxmlformats.org/officeDocument/2006/relationships" xmlns:p="http://schemas.openxmlformats.org/presentationml/2006/main">
   <p:cSld>
     <p:spTree>
@@ -14309,7 +14426,7 @@
 </p:sld>
 </file>
 
-<file path=ppt/slides/slide32.xml><?xml version="1.0" encoding="utf-8"?>
+<file path=ppt/slides/slide33.xml><?xml version="1.0" encoding="utf-8"?>
 <p:sld xmlns:a="http://schemas.openxmlformats.org/drawingml/2006/main" xmlns:r="http://schemas.openxmlformats.org/officeDocument/2006/relationships" xmlns:p="http://schemas.openxmlformats.org/presentationml/2006/main">
   <p:cSld>
     <p:spTree>
@@ -14894,7 +15011,7 @@
 </p:sld>
 </file>
 
-<file path=ppt/slides/slide33.xml><?xml version="1.0" encoding="utf-8"?>
+<file path=ppt/slides/slide34.xml><?xml version="1.0" encoding="utf-8"?>
 <p:sld xmlns:a="http://schemas.openxmlformats.org/drawingml/2006/main" xmlns:r="http://schemas.openxmlformats.org/officeDocument/2006/relationships" xmlns:p="http://schemas.openxmlformats.org/presentationml/2006/main">
   <p:cSld>
     <p:spTree>
@@ -15177,7 +15294,7 @@
 </p:sld>
 </file>
 
-<file path=ppt/slides/slide34.xml><?xml version="1.0" encoding="utf-8"?>
+<file path=ppt/slides/slide35.xml><?xml version="1.0" encoding="utf-8"?>
 <p:sld xmlns:a="http://schemas.openxmlformats.org/drawingml/2006/main" xmlns:r="http://schemas.openxmlformats.org/officeDocument/2006/relationships" xmlns:p="http://schemas.openxmlformats.org/presentationml/2006/main">
   <p:cSld>
     <p:spTree>
@@ -15461,7 +15578,7 @@
 </p:sld>
 </file>
 
-<file path=ppt/slides/slide35.xml><?xml version="1.0" encoding="utf-8"?>
+<file path=ppt/slides/slide36.xml><?xml version="1.0" encoding="utf-8"?>
 <p:sld xmlns:a="http://schemas.openxmlformats.org/drawingml/2006/main" xmlns:r="http://schemas.openxmlformats.org/officeDocument/2006/relationships" xmlns:p="http://schemas.openxmlformats.org/presentationml/2006/main">
   <p:cSld>
     <p:spTree>
@@ -15737,7 +15854,7 @@
 </p:sld>
 </file>
 
-<file path=ppt/slides/slide36.xml><?xml version="1.0" encoding="utf-8"?>
+<file path=ppt/slides/slide37.xml><?xml version="1.0" encoding="utf-8"?>
 <p:sld xmlns:a="http://schemas.openxmlformats.org/drawingml/2006/main" xmlns:r="http://schemas.openxmlformats.org/officeDocument/2006/relationships" xmlns:p="http://schemas.openxmlformats.org/presentationml/2006/main">
   <p:cSld>
     <p:spTree>
@@ -15955,7 +16072,7 @@
 </p:sld>
 </file>
 
-<file path=ppt/slides/slide37.xml><?xml version="1.0" encoding="utf-8"?>
+<file path=ppt/slides/slide38.xml><?xml version="1.0" encoding="utf-8"?>
 <p:sld xmlns:a="http://schemas.openxmlformats.org/drawingml/2006/main" xmlns:r="http://schemas.openxmlformats.org/officeDocument/2006/relationships" xmlns:p="http://schemas.openxmlformats.org/presentationml/2006/main">
   <p:cSld>
     <p:spTree>
@@ -16199,7 +16316,7 @@
 </p:sld>
 </file>
 
-<file path=ppt/slides/slide38.xml><?xml version="1.0" encoding="utf-8"?>
+<file path=ppt/slides/slide39.xml><?xml version="1.0" encoding="utf-8"?>
 <p:sld xmlns:a="http://schemas.openxmlformats.org/drawingml/2006/main" xmlns:r="http://schemas.openxmlformats.org/officeDocument/2006/relationships" xmlns:p="http://schemas.openxmlformats.org/presentationml/2006/main">
   <p:cSld>
     <p:spTree>
@@ -16551,238 +16668,6 @@
         </p:txBody>
       </p:sp>
     </p:spTree>
-  </p:cSld>
-  <p:clrMapOvr>
-    <a:masterClrMapping/>
-  </p:clrMapOvr>
-</p:sld>
-</file>
-
-<file path=ppt/slides/slide39.xml><?xml version="1.0" encoding="utf-8"?>
-<p:sld xmlns:a="http://schemas.openxmlformats.org/drawingml/2006/main" xmlns:r="http://schemas.openxmlformats.org/officeDocument/2006/relationships" xmlns:p="http://schemas.openxmlformats.org/presentationml/2006/main">
-  <p:cSld>
-    <p:spTree>
-      <p:nvGrpSpPr>
-        <p:cNvPr id="1" name="">
-          <a:extLst>
-            <a:ext uri="{FF2B5EF4-FFF2-40B4-BE49-F238E27FC236}">
-              <a16:creationId xmlns:a16="http://schemas.microsoft.com/office/drawing/2014/main" id="{45DFE384-0BB8-2FBD-6547-ABB88D240515}"/>
-            </a:ext>
-          </a:extLst>
-        </p:cNvPr>
-        <p:cNvGrpSpPr/>
-        <p:nvPr/>
-      </p:nvGrpSpPr>
-      <p:grpSpPr>
-        <a:xfrm>
-          <a:off x="0" y="0"/>
-          <a:ext cx="0" cy="0"/>
-          <a:chOff x="0" y="0"/>
-          <a:chExt cx="0" cy="0"/>
-        </a:xfrm>
-      </p:grpSpPr>
-      <p:sp>
-        <p:nvSpPr>
-          <p:cNvPr id="2" name="TextBox 1">
-            <a:extLst>
-              <a:ext uri="{FF2B5EF4-FFF2-40B4-BE49-F238E27FC236}">
-                <a16:creationId xmlns:a16="http://schemas.microsoft.com/office/drawing/2014/main" id="{E25F665C-7448-2AA9-91FF-6E184D99099D}"/>
-              </a:ext>
-            </a:extLst>
-          </p:cNvPr>
-          <p:cNvSpPr txBox="1"/>
-          <p:nvPr/>
-        </p:nvSpPr>
-        <p:spPr>
-          <a:xfrm>
-            <a:off x="598714" y="274321"/>
-            <a:ext cx="7307506" cy="646331"/>
-          </a:xfrm>
-          <a:prstGeom prst="rect">
-            <a:avLst/>
-          </a:prstGeom>
-          <a:noFill/>
-        </p:spPr>
-        <p:txBody>
-          <a:bodyPr wrap="square">
-            <a:spAutoFit/>
-          </a:bodyPr>
-          <a:lstStyle/>
-          <a:p>
-            <a:pPr>
-              <a:defRPr sz="3600" b="1">
-                <a:solidFill>
-                  <a:srgbClr val="232F3E"/>
-                </a:solidFill>
-              </a:defRPr>
-            </a:pPr>
-            <a:r>
-              <a:rPr lang="en-IN" sz="3600" dirty="0"/>
-              <a:t>Knowledge Check</a:t>
-            </a:r>
-            <a:endParaRPr sz="3600" dirty="0"/>
-          </a:p>
-        </p:txBody>
-      </p:sp>
-      <p:sp>
-        <p:nvSpPr>
-          <p:cNvPr id="3" name="TextBox 2">
-            <a:extLst>
-              <a:ext uri="{FF2B5EF4-FFF2-40B4-BE49-F238E27FC236}">
-                <a16:creationId xmlns:a16="http://schemas.microsoft.com/office/drawing/2014/main" id="{BCA7C4A9-54BF-D2BB-E3E2-8DEBAA095261}"/>
-              </a:ext>
-            </a:extLst>
-          </p:cNvPr>
-          <p:cNvSpPr txBox="1"/>
-          <p:nvPr/>
-        </p:nvSpPr>
-        <p:spPr>
-          <a:xfrm>
-            <a:off x="772886" y="1097280"/>
-            <a:ext cx="9255034" cy="4278094"/>
-          </a:xfrm>
-          <a:prstGeom prst="rect">
-            <a:avLst/>
-          </a:prstGeom>
-          <a:noFill/>
-        </p:spPr>
-        <p:txBody>
-          <a:bodyPr wrap="square">
-            <a:spAutoFit/>
-          </a:bodyPr>
-          <a:lstStyle/>
-          <a:p>
-            <a:r>
-              <a:rPr lang="en-US" sz="1600" b="1" dirty="0"/>
-              <a:t>Part 1: Create policies for these scenarios:</a:t>
-            </a:r>
-          </a:p>
-          <a:p>
-            <a:r>
-              <a:rPr lang="en-US" sz="1600" dirty="0"/>
-              <a:t>1. Developer needs read/write to dev-* S3 buckets only</a:t>
-            </a:r>
-          </a:p>
-          <a:p>
-            <a:r>
-              <a:rPr lang="en-US" sz="1600" dirty="0"/>
-              <a:t>2. Auditor needs read-only access to CloudTrail logs</a:t>
-            </a:r>
-          </a:p>
-          <a:p>
-            <a:r>
-              <a:rPr lang="en-US" sz="1600" dirty="0"/>
-              <a:t>3. Application needs to write to DynamoDB table "users“</a:t>
-            </a:r>
-          </a:p>
-          <a:p>
-            <a:endParaRPr lang="en-US" sz="1600" dirty="0"/>
-          </a:p>
-          <a:p>
-            <a:r>
-              <a:rPr lang="en-US" sz="1600" b="1" dirty="0"/>
-              <a:t>Part 2: Real-World Scenario Discussion:</a:t>
-            </a:r>
-          </a:p>
-          <a:p>
-            <a:r>
-              <a:rPr lang="en-US" sz="1600" b="1" dirty="0"/>
-              <a:t>Scenario:</a:t>
-            </a:r>
-          </a:p>
-          <a:p>
-            <a:r>
-              <a:rPr lang="en-US" sz="1600" dirty="0"/>
-              <a:t>A developer needs to:</a:t>
-            </a:r>
-          </a:p>
-          <a:p>
-            <a:pPr marL="285750" indent="-285750">
-              <a:buFont typeface="Arial" panose="020B0604020202020204" pitchFamily="34" charset="0"/>
-              <a:buChar char="•"/>
-            </a:pPr>
-            <a:r>
-              <a:rPr lang="en-US" sz="1600" dirty="0"/>
-              <a:t>Deploy code to EC2 instances</a:t>
-            </a:r>
-          </a:p>
-          <a:p>
-            <a:pPr marL="285750" indent="-285750">
-              <a:buFont typeface="Arial" panose="020B0604020202020204" pitchFamily="34" charset="0"/>
-              <a:buChar char="•"/>
-            </a:pPr>
-            <a:r>
-              <a:rPr lang="en-US" sz="1600" dirty="0"/>
-              <a:t>Read/write to application S3 bucket</a:t>
-            </a:r>
-          </a:p>
-          <a:p>
-            <a:pPr marL="285750" indent="-285750">
-              <a:buFont typeface="Arial" panose="020B0604020202020204" pitchFamily="34" charset="0"/>
-              <a:buChar char="•"/>
-            </a:pPr>
-            <a:r>
-              <a:rPr lang="en-US" sz="1600" dirty="0"/>
-              <a:t>Query application DynamoDB tables</a:t>
-            </a:r>
-          </a:p>
-          <a:p>
-            <a:pPr marL="285750" indent="-285750">
-              <a:buFont typeface="Arial" panose="020B0604020202020204" pitchFamily="34" charset="0"/>
-              <a:buChar char="•"/>
-            </a:pPr>
-            <a:r>
-              <a:rPr lang="en-US" sz="1600" dirty="0"/>
-              <a:t>View CloudWatch logs</a:t>
-            </a:r>
-          </a:p>
-          <a:p>
-            <a:endParaRPr lang="en-US" sz="1600" dirty="0"/>
-          </a:p>
-          <a:p>
-            <a:r>
-              <a:rPr lang="en-US" sz="1600" dirty="0"/>
-              <a:t>Design the IAM setup:</a:t>
-            </a:r>
-          </a:p>
-          <a:p>
-            <a:pPr marL="285750" indent="-285750">
-              <a:buFont typeface="Arial" panose="020B0604020202020204" pitchFamily="34" charset="0"/>
-              <a:buChar char="•"/>
-            </a:pPr>
-            <a:r>
-              <a:rPr lang="en-US" sz="1600" dirty="0"/>
-              <a:t>What groups would you create?</a:t>
-            </a:r>
-          </a:p>
-          <a:p>
-            <a:pPr marL="285750" indent="-285750">
-              <a:buFont typeface="Arial" panose="020B0604020202020204" pitchFamily="34" charset="0"/>
-              <a:buChar char="•"/>
-            </a:pPr>
-            <a:r>
-              <a:rPr lang="en-US" sz="1600" dirty="0"/>
-              <a:t>What policies would you attach?</a:t>
-            </a:r>
-          </a:p>
-          <a:p>
-            <a:pPr marL="285750" indent="-285750">
-              <a:buFont typeface="Arial" panose="020B0604020202020204" pitchFamily="34" charset="0"/>
-              <a:buChar char="•"/>
-            </a:pPr>
-            <a:r>
-              <a:rPr lang="en-US" sz="1600" dirty="0"/>
-              <a:t>What additional security measures?</a:t>
-            </a:r>
-          </a:p>
-        </p:txBody>
-      </p:sp>
-    </p:spTree>
-    <p:extLst>
-      <p:ext uri="{BB962C8B-B14F-4D97-AF65-F5344CB8AC3E}">
-        <p14:creationId xmlns:p14="http://schemas.microsoft.com/office/powerpoint/2010/main" val="309414456"/>
-      </p:ext>
-    </p:extLst>
   </p:cSld>
   <p:clrMapOvr>
     <a:masterClrMapping/>
@@ -16907,6 +16792,238 @@
         <p:cNvPr id="1" name="">
           <a:extLst>
             <a:ext uri="{FF2B5EF4-FFF2-40B4-BE49-F238E27FC236}">
+              <a16:creationId xmlns:a16="http://schemas.microsoft.com/office/drawing/2014/main" id="{45DFE384-0BB8-2FBD-6547-ABB88D240515}"/>
+            </a:ext>
+          </a:extLst>
+        </p:cNvPr>
+        <p:cNvGrpSpPr/>
+        <p:nvPr/>
+      </p:nvGrpSpPr>
+      <p:grpSpPr>
+        <a:xfrm>
+          <a:off x="0" y="0"/>
+          <a:ext cx="0" cy="0"/>
+          <a:chOff x="0" y="0"/>
+          <a:chExt cx="0" cy="0"/>
+        </a:xfrm>
+      </p:grpSpPr>
+      <p:sp>
+        <p:nvSpPr>
+          <p:cNvPr id="2" name="TextBox 1">
+            <a:extLst>
+              <a:ext uri="{FF2B5EF4-FFF2-40B4-BE49-F238E27FC236}">
+                <a16:creationId xmlns:a16="http://schemas.microsoft.com/office/drawing/2014/main" id="{E25F665C-7448-2AA9-91FF-6E184D99099D}"/>
+              </a:ext>
+            </a:extLst>
+          </p:cNvPr>
+          <p:cNvSpPr txBox="1"/>
+          <p:nvPr/>
+        </p:nvSpPr>
+        <p:spPr>
+          <a:xfrm>
+            <a:off x="598714" y="274321"/>
+            <a:ext cx="7307506" cy="646331"/>
+          </a:xfrm>
+          <a:prstGeom prst="rect">
+            <a:avLst/>
+          </a:prstGeom>
+          <a:noFill/>
+        </p:spPr>
+        <p:txBody>
+          <a:bodyPr wrap="square">
+            <a:spAutoFit/>
+          </a:bodyPr>
+          <a:lstStyle/>
+          <a:p>
+            <a:pPr>
+              <a:defRPr sz="3600" b="1">
+                <a:solidFill>
+                  <a:srgbClr val="232F3E"/>
+                </a:solidFill>
+              </a:defRPr>
+            </a:pPr>
+            <a:r>
+              <a:rPr lang="en-IN" sz="3600" dirty="0"/>
+              <a:t>Knowledge Check</a:t>
+            </a:r>
+            <a:endParaRPr sz="3600" dirty="0"/>
+          </a:p>
+        </p:txBody>
+      </p:sp>
+      <p:sp>
+        <p:nvSpPr>
+          <p:cNvPr id="3" name="TextBox 2">
+            <a:extLst>
+              <a:ext uri="{FF2B5EF4-FFF2-40B4-BE49-F238E27FC236}">
+                <a16:creationId xmlns:a16="http://schemas.microsoft.com/office/drawing/2014/main" id="{BCA7C4A9-54BF-D2BB-E3E2-8DEBAA095261}"/>
+              </a:ext>
+            </a:extLst>
+          </p:cNvPr>
+          <p:cNvSpPr txBox="1"/>
+          <p:nvPr/>
+        </p:nvSpPr>
+        <p:spPr>
+          <a:xfrm>
+            <a:off x="772886" y="1097280"/>
+            <a:ext cx="9255034" cy="4278094"/>
+          </a:xfrm>
+          <a:prstGeom prst="rect">
+            <a:avLst/>
+          </a:prstGeom>
+          <a:noFill/>
+        </p:spPr>
+        <p:txBody>
+          <a:bodyPr wrap="square">
+            <a:spAutoFit/>
+          </a:bodyPr>
+          <a:lstStyle/>
+          <a:p>
+            <a:r>
+              <a:rPr lang="en-US" sz="1600" b="1" dirty="0"/>
+              <a:t>Part 1: Create policies for these scenarios:</a:t>
+            </a:r>
+          </a:p>
+          <a:p>
+            <a:r>
+              <a:rPr lang="en-US" sz="1600" dirty="0"/>
+              <a:t>1. Developer needs read/write to dev-* S3 buckets only</a:t>
+            </a:r>
+          </a:p>
+          <a:p>
+            <a:r>
+              <a:rPr lang="en-US" sz="1600" dirty="0"/>
+              <a:t>2. Auditor needs read-only access to CloudTrail logs</a:t>
+            </a:r>
+          </a:p>
+          <a:p>
+            <a:r>
+              <a:rPr lang="en-US" sz="1600" dirty="0"/>
+              <a:t>3. Application needs to write to DynamoDB table "users“</a:t>
+            </a:r>
+          </a:p>
+          <a:p>
+            <a:endParaRPr lang="en-US" sz="1600" dirty="0"/>
+          </a:p>
+          <a:p>
+            <a:r>
+              <a:rPr lang="en-US" sz="1600" b="1" dirty="0"/>
+              <a:t>Part 2: Real-World Scenario Discussion:</a:t>
+            </a:r>
+          </a:p>
+          <a:p>
+            <a:r>
+              <a:rPr lang="en-US" sz="1600" b="1" dirty="0"/>
+              <a:t>Scenario:</a:t>
+            </a:r>
+          </a:p>
+          <a:p>
+            <a:r>
+              <a:rPr lang="en-US" sz="1600" dirty="0"/>
+              <a:t>A developer needs to:</a:t>
+            </a:r>
+          </a:p>
+          <a:p>
+            <a:pPr marL="285750" indent="-285750">
+              <a:buFont typeface="Arial" panose="020B0604020202020204" pitchFamily="34" charset="0"/>
+              <a:buChar char="•"/>
+            </a:pPr>
+            <a:r>
+              <a:rPr lang="en-US" sz="1600" dirty="0"/>
+              <a:t>Deploy code to EC2 instances</a:t>
+            </a:r>
+          </a:p>
+          <a:p>
+            <a:pPr marL="285750" indent="-285750">
+              <a:buFont typeface="Arial" panose="020B0604020202020204" pitchFamily="34" charset="0"/>
+              <a:buChar char="•"/>
+            </a:pPr>
+            <a:r>
+              <a:rPr lang="en-US" sz="1600" dirty="0"/>
+              <a:t>Read/write to application S3 bucket</a:t>
+            </a:r>
+          </a:p>
+          <a:p>
+            <a:pPr marL="285750" indent="-285750">
+              <a:buFont typeface="Arial" panose="020B0604020202020204" pitchFamily="34" charset="0"/>
+              <a:buChar char="•"/>
+            </a:pPr>
+            <a:r>
+              <a:rPr lang="en-US" sz="1600" dirty="0"/>
+              <a:t>Query application DynamoDB tables</a:t>
+            </a:r>
+          </a:p>
+          <a:p>
+            <a:pPr marL="285750" indent="-285750">
+              <a:buFont typeface="Arial" panose="020B0604020202020204" pitchFamily="34" charset="0"/>
+              <a:buChar char="•"/>
+            </a:pPr>
+            <a:r>
+              <a:rPr lang="en-US" sz="1600" dirty="0"/>
+              <a:t>View CloudWatch logs</a:t>
+            </a:r>
+          </a:p>
+          <a:p>
+            <a:endParaRPr lang="en-US" sz="1600" dirty="0"/>
+          </a:p>
+          <a:p>
+            <a:r>
+              <a:rPr lang="en-US" sz="1600" dirty="0"/>
+              <a:t>Design the IAM setup:</a:t>
+            </a:r>
+          </a:p>
+          <a:p>
+            <a:pPr marL="285750" indent="-285750">
+              <a:buFont typeface="Arial" panose="020B0604020202020204" pitchFamily="34" charset="0"/>
+              <a:buChar char="•"/>
+            </a:pPr>
+            <a:r>
+              <a:rPr lang="en-US" sz="1600" dirty="0"/>
+              <a:t>What groups would you create?</a:t>
+            </a:r>
+          </a:p>
+          <a:p>
+            <a:pPr marL="285750" indent="-285750">
+              <a:buFont typeface="Arial" panose="020B0604020202020204" pitchFamily="34" charset="0"/>
+              <a:buChar char="•"/>
+            </a:pPr>
+            <a:r>
+              <a:rPr lang="en-US" sz="1600" dirty="0"/>
+              <a:t>What policies would you attach?</a:t>
+            </a:r>
+          </a:p>
+          <a:p>
+            <a:pPr marL="285750" indent="-285750">
+              <a:buFont typeface="Arial" panose="020B0604020202020204" pitchFamily="34" charset="0"/>
+              <a:buChar char="•"/>
+            </a:pPr>
+            <a:r>
+              <a:rPr lang="en-US" sz="1600" dirty="0"/>
+              <a:t>What additional security measures?</a:t>
+            </a:r>
+          </a:p>
+        </p:txBody>
+      </p:sp>
+    </p:spTree>
+    <p:extLst>
+      <p:ext uri="{BB962C8B-B14F-4D97-AF65-F5344CB8AC3E}">
+        <p14:creationId xmlns:p14="http://schemas.microsoft.com/office/powerpoint/2010/main" val="309414456"/>
+      </p:ext>
+    </p:extLst>
+  </p:cSld>
+  <p:clrMapOvr>
+    <a:masterClrMapping/>
+  </p:clrMapOvr>
+</p:sld>
+</file>
+
+<file path=ppt/slides/slide41.xml><?xml version="1.0" encoding="utf-8"?>
+<p:sld xmlns:a="http://schemas.openxmlformats.org/drawingml/2006/main" xmlns:r="http://schemas.openxmlformats.org/officeDocument/2006/relationships" xmlns:p="http://schemas.openxmlformats.org/presentationml/2006/main">
+  <p:cSld>
+    <p:spTree>
+      <p:nvGrpSpPr>
+        <p:cNvPr id="1" name="">
+          <a:extLst>
+            <a:ext uri="{FF2B5EF4-FFF2-40B4-BE49-F238E27FC236}">
               <a16:creationId xmlns:a16="http://schemas.microsoft.com/office/drawing/2014/main" id="{266E78D7-4538-EF0B-E9F9-B611753FB0EE}"/>
             </a:ext>
           </a:extLst>
@@ -17056,7 +17173,7 @@
 </p:sld>
 </file>
 
-<file path=ppt/slides/slide41.xml><?xml version="1.0" encoding="utf-8"?>
+<file path=ppt/slides/slide42.xml><?xml version="1.0" encoding="utf-8"?>
 <p:sld xmlns:a="http://schemas.openxmlformats.org/drawingml/2006/main" xmlns:r="http://schemas.openxmlformats.org/officeDocument/2006/relationships" xmlns:p="http://schemas.openxmlformats.org/presentationml/2006/main">
   <p:cSld>
     <p:spTree>
@@ -17358,7 +17475,7 @@
 </p:sld>
 </file>
 
-<file path=ppt/slides/slide42.xml><?xml version="1.0" encoding="utf-8"?>
+<file path=ppt/slides/slide43.xml><?xml version="1.0" encoding="utf-8"?>
 <p:sld xmlns:a="http://schemas.openxmlformats.org/drawingml/2006/main" xmlns:r="http://schemas.openxmlformats.org/officeDocument/2006/relationships" xmlns:p="http://schemas.openxmlformats.org/presentationml/2006/main">
   <p:cSld>
     <p:spTree>
@@ -17889,7 +18006,7 @@
 </p:sld>
 </file>
 
-<file path=ppt/slides/slide43.xml><?xml version="1.0" encoding="utf-8"?>
+<file path=ppt/slides/slide44.xml><?xml version="1.0" encoding="utf-8"?>
 <p:sld xmlns:a="http://schemas.openxmlformats.org/drawingml/2006/main" xmlns:r="http://schemas.openxmlformats.org/officeDocument/2006/relationships" xmlns:p="http://schemas.openxmlformats.org/presentationml/2006/main">
   <p:cSld>
     <p:spTree>
@@ -18270,7 +18387,7 @@
 </p:sld>
 </file>
 
-<file path=ppt/slides/slide44.xml><?xml version="1.0" encoding="utf-8"?>
+<file path=ppt/slides/slide45.xml><?xml version="1.0" encoding="utf-8"?>
 <p:sld xmlns:a="http://schemas.openxmlformats.org/drawingml/2006/main" xmlns:r="http://schemas.openxmlformats.org/officeDocument/2006/relationships" xmlns:p="http://schemas.openxmlformats.org/presentationml/2006/main">
   <p:cSld>
     <p:spTree>
@@ -18756,7 +18873,7 @@
 </p:sld>
 </file>
 
-<file path=ppt/slides/slide45.xml><?xml version="1.0" encoding="utf-8"?>
+<file path=ppt/slides/slide46.xml><?xml version="1.0" encoding="utf-8"?>
 <p:sld xmlns:a="http://schemas.openxmlformats.org/drawingml/2006/main" xmlns:r="http://schemas.openxmlformats.org/officeDocument/2006/relationships" xmlns:p="http://schemas.openxmlformats.org/presentationml/2006/main">
   <p:cSld>
     <p:spTree>
@@ -19101,7 +19218,7 @@
 </p:sld>
 </file>
 
-<file path=ppt/slides/slide46.xml><?xml version="1.0" encoding="utf-8"?>
+<file path=ppt/slides/slide47.xml><?xml version="1.0" encoding="utf-8"?>
 <p:sld xmlns:a="http://schemas.openxmlformats.org/drawingml/2006/main" xmlns:r="http://schemas.openxmlformats.org/officeDocument/2006/relationships" xmlns:p="http://schemas.openxmlformats.org/presentationml/2006/main">
   <p:cSld>
     <p:spTree>
@@ -19416,7 +19533,7 @@
 </p:sld>
 </file>
 
-<file path=ppt/slides/slide47.xml><?xml version="1.0" encoding="utf-8"?>
+<file path=ppt/slides/slide48.xml><?xml version="1.0" encoding="utf-8"?>
 <p:sld xmlns:a="http://schemas.openxmlformats.org/drawingml/2006/main" xmlns:r="http://schemas.openxmlformats.org/officeDocument/2006/relationships" xmlns:p="http://schemas.openxmlformats.org/presentationml/2006/main">
   <p:cSld>
     <p:spTree>
@@ -19778,7 +19895,7 @@
 </p:sld>
 </file>
 
-<file path=ppt/slides/slide48.xml><?xml version="1.0" encoding="utf-8"?>
+<file path=ppt/slides/slide49.xml><?xml version="1.0" encoding="utf-8"?>
 <p:sld xmlns:a="http://schemas.openxmlformats.org/drawingml/2006/main" xmlns:r="http://schemas.openxmlformats.org/officeDocument/2006/relationships" xmlns:p="http://schemas.openxmlformats.org/presentationml/2006/main">
   <p:cSld>
     <p:spTree>
@@ -20203,306 +20320,6 @@
             <a:r>
               <a:rPr lang="en-IN" sz="1600" dirty="0"/>
               <a:t>Country/Geo-based blocking</a:t>
-            </a:r>
-          </a:p>
-        </p:txBody>
-      </p:sp>
-    </p:spTree>
-  </p:cSld>
-  <p:clrMapOvr>
-    <a:masterClrMapping/>
-  </p:clrMapOvr>
-</p:sld>
-</file>
-
-<file path=ppt/slides/slide49.xml><?xml version="1.0" encoding="utf-8"?>
-<p:sld xmlns:a="http://schemas.openxmlformats.org/drawingml/2006/main" xmlns:r="http://schemas.openxmlformats.org/officeDocument/2006/relationships" xmlns:p="http://schemas.openxmlformats.org/presentationml/2006/main">
-  <p:cSld>
-    <p:spTree>
-      <p:nvGrpSpPr>
-        <p:cNvPr id="1" name=""/>
-        <p:cNvGrpSpPr/>
-        <p:nvPr/>
-      </p:nvGrpSpPr>
-      <p:grpSpPr>
-        <a:xfrm>
-          <a:off x="0" y="0"/>
-          <a:ext cx="0" cy="0"/>
-          <a:chOff x="0" y="0"/>
-          <a:chExt cx="0" cy="0"/>
-        </a:xfrm>
-      </p:grpSpPr>
-      <p:sp>
-        <p:nvSpPr>
-          <p:cNvPr id="2" name="TextBox 1"/>
-          <p:cNvSpPr txBox="1"/>
-          <p:nvPr/>
-        </p:nvSpPr>
-        <p:spPr>
-          <a:xfrm>
-            <a:off x="555171" y="274321"/>
-            <a:ext cx="4018405" cy="646331"/>
-          </a:xfrm>
-          <a:prstGeom prst="rect">
-            <a:avLst/>
-          </a:prstGeom>
-          <a:noFill/>
-        </p:spPr>
-        <p:txBody>
-          <a:bodyPr wrap="square">
-            <a:spAutoFit/>
-          </a:bodyPr>
-          <a:lstStyle/>
-          <a:p>
-            <a:pPr>
-              <a:defRPr sz="3600" b="1">
-                <a:solidFill>
-                  <a:srgbClr val="232F3E"/>
-                </a:solidFill>
-              </a:defRPr>
-            </a:pPr>
-            <a:r>
-              <a:rPr sz="3600" dirty="0"/>
-              <a:t>AWS Shield</a:t>
-            </a:r>
-          </a:p>
-        </p:txBody>
-      </p:sp>
-      <p:sp>
-        <p:nvSpPr>
-          <p:cNvPr id="3" name="TextBox 2"/>
-          <p:cNvSpPr txBox="1"/>
-          <p:nvPr/>
-        </p:nvSpPr>
-        <p:spPr>
-          <a:xfrm>
-            <a:off x="555171" y="1108166"/>
-            <a:ext cx="11299372" cy="5463034"/>
-          </a:xfrm>
-          <a:prstGeom prst="rect">
-            <a:avLst/>
-          </a:prstGeom>
-          <a:noFill/>
-        </p:spPr>
-        <p:txBody>
-          <a:bodyPr wrap="square">
-            <a:spAutoFit/>
-          </a:bodyPr>
-          <a:lstStyle/>
-          <a:p>
-            <a:pPr>
-              <a:spcBef>
-                <a:spcPts val="600"/>
-              </a:spcBef>
-            </a:pPr>
-            <a:r>
-              <a:rPr lang="en-US" sz="1600" b="1" dirty="0"/>
-              <a:t>🛡️ What is AWS Shield?</a:t>
-            </a:r>
-          </a:p>
-          <a:p>
-            <a:pPr>
-              <a:spcBef>
-                <a:spcPts val="600"/>
-              </a:spcBef>
-            </a:pPr>
-            <a:r>
-              <a:rPr lang="en-US" sz="1600" dirty="0"/>
-              <a:t>A managed service that protects applications running on AWS from </a:t>
-            </a:r>
-            <a:r>
-              <a:rPr lang="en-US" sz="1600" b="1" dirty="0"/>
-              <a:t>DDoS attacks</a:t>
-            </a:r>
-            <a:r>
-              <a:rPr lang="en-US" sz="1600" dirty="0"/>
-              <a:t> (Layer 3/4 and some Layer 7 scenarios).</a:t>
-            </a:r>
-          </a:p>
-          <a:p>
-            <a:pPr>
-              <a:spcBef>
-                <a:spcPts val="600"/>
-              </a:spcBef>
-            </a:pPr>
-            <a:endParaRPr lang="en-US" sz="1600" dirty="0"/>
-          </a:p>
-          <a:p>
-            <a:pPr>
-              <a:spcBef>
-                <a:spcPts val="600"/>
-              </a:spcBef>
-            </a:pPr>
-            <a:r>
-              <a:rPr lang="en-US" sz="1600" dirty="0"/>
-              <a:t>Available in 2 options:</a:t>
-            </a:r>
-          </a:p>
-          <a:p>
-            <a:pPr>
-              <a:spcBef>
-                <a:spcPts val="600"/>
-              </a:spcBef>
-            </a:pPr>
-            <a:endParaRPr lang="en-US" sz="1600" dirty="0"/>
-          </a:p>
-          <a:p>
-            <a:r>
-              <a:rPr lang="en-US" sz="1600" b="1" dirty="0"/>
-              <a:t>1.) Shield Standard (Free / Default): </a:t>
-            </a:r>
-            <a:r>
-              <a:rPr lang="en-US" sz="1600" dirty="0"/>
-              <a:t>Automatically enabled for </a:t>
-            </a:r>
-            <a:r>
-              <a:rPr lang="en-US" sz="1600" b="1" dirty="0"/>
-              <a:t>all AWS customers</a:t>
-            </a:r>
-            <a:endParaRPr lang="en-US" sz="1600" dirty="0"/>
-          </a:p>
-          <a:p>
-            <a:pPr marL="285750" indent="-285750">
-              <a:buFont typeface="Arial" panose="020B0604020202020204" pitchFamily="34" charset="0"/>
-              <a:buChar char="•"/>
-            </a:pPr>
-            <a:r>
-              <a:rPr lang="en-US" sz="1600" dirty="0"/>
-              <a:t>Protects against </a:t>
-            </a:r>
-            <a:r>
-              <a:rPr lang="en-US" sz="1600" b="1" dirty="0"/>
-              <a:t>common network &amp; transport layer attacks</a:t>
-            </a:r>
-            <a:endParaRPr lang="en-US" sz="1600" dirty="0"/>
-          </a:p>
-          <a:p>
-            <a:pPr marL="742950" lvl="1" indent="-285750">
-              <a:buFont typeface="Courier New" panose="02070309020205020404" pitchFamily="49" charset="0"/>
-              <a:buChar char="o"/>
-            </a:pPr>
-            <a:r>
-              <a:rPr lang="en-US" sz="1600" dirty="0"/>
-              <a:t>SYN/UDP floods</a:t>
-            </a:r>
-          </a:p>
-          <a:p>
-            <a:pPr marL="742950" lvl="1" indent="-285750">
-              <a:buFont typeface="Courier New" panose="02070309020205020404" pitchFamily="49" charset="0"/>
-              <a:buChar char="o"/>
-            </a:pPr>
-            <a:r>
-              <a:rPr lang="en-US" sz="1600" dirty="0"/>
-              <a:t>Reflection attacks</a:t>
-            </a:r>
-          </a:p>
-          <a:p>
-            <a:pPr marL="742950" lvl="1" indent="-285750">
-              <a:buFont typeface="Courier New" panose="02070309020205020404" pitchFamily="49" charset="0"/>
-              <a:buChar char="o"/>
-            </a:pPr>
-            <a:r>
-              <a:rPr lang="en-US" sz="1600" dirty="0"/>
-              <a:t>Port exhaustion</a:t>
-            </a:r>
-          </a:p>
-          <a:p>
-            <a:pPr marL="285750" indent="-285750">
-              <a:buFont typeface="Arial" panose="020B0604020202020204" pitchFamily="34" charset="0"/>
-              <a:buChar char="•"/>
-            </a:pPr>
-            <a:r>
-              <a:rPr lang="en-US" sz="1600" dirty="0"/>
-              <a:t>Integrated with CloudFront, Route 53, and Global Accelerator</a:t>
-            </a:r>
-          </a:p>
-          <a:p>
-            <a:pPr marL="285750" indent="-285750">
-              <a:buFont typeface="Arial" panose="020B0604020202020204" pitchFamily="34" charset="0"/>
-              <a:buChar char="•"/>
-            </a:pPr>
-            <a:r>
-              <a:rPr lang="en-US" sz="1600" dirty="0"/>
-              <a:t>No setup required</a:t>
-            </a:r>
-          </a:p>
-          <a:p>
-            <a:endParaRPr lang="en-US" sz="1600" dirty="0"/>
-          </a:p>
-          <a:p>
-            <a:pPr>
-              <a:spcBef>
-                <a:spcPts val="600"/>
-              </a:spcBef>
-            </a:pPr>
-            <a:r>
-              <a:rPr lang="en-US" sz="1600" b="1" dirty="0"/>
-              <a:t>2.) Shield Advanced ($3,000/month per org) with Enhanced DDoS detection &amp; mitigation</a:t>
-            </a:r>
-            <a:endParaRPr lang="en-US" sz="1600" dirty="0"/>
-          </a:p>
-          <a:p>
-            <a:pPr marL="285750" indent="-285750">
-              <a:spcBef>
-                <a:spcPts val="600"/>
-              </a:spcBef>
-              <a:buFont typeface="Arial" panose="020B0604020202020204" pitchFamily="34" charset="0"/>
-              <a:buChar char="•"/>
-            </a:pPr>
-            <a:r>
-              <a:rPr lang="en-US" sz="1600" dirty="0"/>
-              <a:t>Protection for: CloudFront, Route 53, Global Accelerator, ALB / NLB, Elastic IPs</a:t>
-            </a:r>
-          </a:p>
-          <a:p>
-            <a:pPr marL="285750" indent="-285750">
-              <a:spcBef>
-                <a:spcPts val="600"/>
-              </a:spcBef>
-              <a:buFont typeface="Arial" panose="020B0604020202020204" pitchFamily="34" charset="0"/>
-              <a:buChar char="•"/>
-            </a:pPr>
-            <a:r>
-              <a:rPr lang="en-US" sz="1600" b="1" dirty="0"/>
-              <a:t>24/7 access to AWS DDoS Response Team (DRT)</a:t>
-            </a:r>
-            <a:endParaRPr lang="en-US" sz="1600" dirty="0"/>
-          </a:p>
-          <a:p>
-            <a:pPr marL="285750" indent="-285750">
-              <a:spcBef>
-                <a:spcPts val="600"/>
-              </a:spcBef>
-              <a:buFont typeface="Arial" panose="020B0604020202020204" pitchFamily="34" charset="0"/>
-              <a:buChar char="•"/>
-            </a:pPr>
-            <a:r>
-              <a:rPr lang="en-US" sz="1600" b="1" dirty="0"/>
-              <a:t>Cost protection</a:t>
-            </a:r>
-            <a:r>
-              <a:rPr lang="en-US" sz="1600" dirty="0"/>
-              <a:t> during DDoS attacks</a:t>
-            </a:r>
-            <a:br>
-              <a:rPr lang="en-US" sz="1600" dirty="0"/>
-            </a:br>
-            <a:r>
-              <a:rPr lang="en-US" sz="1600" dirty="0"/>
-              <a:t>(Credits for scaling costs triggered by the attack)</a:t>
-            </a:r>
-          </a:p>
-          <a:p>
-            <a:pPr marL="285750" indent="-285750">
-              <a:spcBef>
-                <a:spcPts val="600"/>
-              </a:spcBef>
-              <a:buFont typeface="Arial" panose="020B0604020202020204" pitchFamily="34" charset="0"/>
-              <a:buChar char="•"/>
-            </a:pPr>
-            <a:r>
-              <a:rPr lang="en-US" sz="1600" dirty="0"/>
-              <a:t>Detailed attack diagnostics &amp; real-time visibility</a:t>
             </a:r>
           </a:p>
         </p:txBody>
@@ -21041,6 +20858,306 @@
         </p:nvSpPr>
         <p:spPr>
           <a:xfrm>
+            <a:off x="555171" y="274321"/>
+            <a:ext cx="4018405" cy="646331"/>
+          </a:xfrm>
+          <a:prstGeom prst="rect">
+            <a:avLst/>
+          </a:prstGeom>
+          <a:noFill/>
+        </p:spPr>
+        <p:txBody>
+          <a:bodyPr wrap="square">
+            <a:spAutoFit/>
+          </a:bodyPr>
+          <a:lstStyle/>
+          <a:p>
+            <a:pPr>
+              <a:defRPr sz="3600" b="1">
+                <a:solidFill>
+                  <a:srgbClr val="232F3E"/>
+                </a:solidFill>
+              </a:defRPr>
+            </a:pPr>
+            <a:r>
+              <a:rPr sz="3600" dirty="0"/>
+              <a:t>AWS Shield</a:t>
+            </a:r>
+          </a:p>
+        </p:txBody>
+      </p:sp>
+      <p:sp>
+        <p:nvSpPr>
+          <p:cNvPr id="3" name="TextBox 2"/>
+          <p:cNvSpPr txBox="1"/>
+          <p:nvPr/>
+        </p:nvSpPr>
+        <p:spPr>
+          <a:xfrm>
+            <a:off x="555171" y="1108166"/>
+            <a:ext cx="11299372" cy="5463034"/>
+          </a:xfrm>
+          <a:prstGeom prst="rect">
+            <a:avLst/>
+          </a:prstGeom>
+          <a:noFill/>
+        </p:spPr>
+        <p:txBody>
+          <a:bodyPr wrap="square">
+            <a:spAutoFit/>
+          </a:bodyPr>
+          <a:lstStyle/>
+          <a:p>
+            <a:pPr>
+              <a:spcBef>
+                <a:spcPts val="600"/>
+              </a:spcBef>
+            </a:pPr>
+            <a:r>
+              <a:rPr lang="en-US" sz="1600" b="1" dirty="0"/>
+              <a:t>🛡️ What is AWS Shield?</a:t>
+            </a:r>
+          </a:p>
+          <a:p>
+            <a:pPr>
+              <a:spcBef>
+                <a:spcPts val="600"/>
+              </a:spcBef>
+            </a:pPr>
+            <a:r>
+              <a:rPr lang="en-US" sz="1600" dirty="0"/>
+              <a:t>A managed service that protects applications running on AWS from </a:t>
+            </a:r>
+            <a:r>
+              <a:rPr lang="en-US" sz="1600" b="1" dirty="0"/>
+              <a:t>DDoS attacks</a:t>
+            </a:r>
+            <a:r>
+              <a:rPr lang="en-US" sz="1600" dirty="0"/>
+              <a:t> (Layer 3/4 and some Layer 7 scenarios).</a:t>
+            </a:r>
+          </a:p>
+          <a:p>
+            <a:pPr>
+              <a:spcBef>
+                <a:spcPts val="600"/>
+              </a:spcBef>
+            </a:pPr>
+            <a:endParaRPr lang="en-US" sz="1600" dirty="0"/>
+          </a:p>
+          <a:p>
+            <a:pPr>
+              <a:spcBef>
+                <a:spcPts val="600"/>
+              </a:spcBef>
+            </a:pPr>
+            <a:r>
+              <a:rPr lang="en-US" sz="1600" dirty="0"/>
+              <a:t>Available in 2 options:</a:t>
+            </a:r>
+          </a:p>
+          <a:p>
+            <a:pPr>
+              <a:spcBef>
+                <a:spcPts val="600"/>
+              </a:spcBef>
+            </a:pPr>
+            <a:endParaRPr lang="en-US" sz="1600" dirty="0"/>
+          </a:p>
+          <a:p>
+            <a:r>
+              <a:rPr lang="en-US" sz="1600" b="1" dirty="0"/>
+              <a:t>1.) Shield Standard (Free / Default): </a:t>
+            </a:r>
+            <a:r>
+              <a:rPr lang="en-US" sz="1600" dirty="0"/>
+              <a:t>Automatically enabled for </a:t>
+            </a:r>
+            <a:r>
+              <a:rPr lang="en-US" sz="1600" b="1" dirty="0"/>
+              <a:t>all AWS customers</a:t>
+            </a:r>
+            <a:endParaRPr lang="en-US" sz="1600" dirty="0"/>
+          </a:p>
+          <a:p>
+            <a:pPr marL="285750" indent="-285750">
+              <a:buFont typeface="Arial" panose="020B0604020202020204" pitchFamily="34" charset="0"/>
+              <a:buChar char="•"/>
+            </a:pPr>
+            <a:r>
+              <a:rPr lang="en-US" sz="1600" dirty="0"/>
+              <a:t>Protects against </a:t>
+            </a:r>
+            <a:r>
+              <a:rPr lang="en-US" sz="1600" b="1" dirty="0"/>
+              <a:t>common network &amp; transport layer attacks</a:t>
+            </a:r>
+            <a:endParaRPr lang="en-US" sz="1600" dirty="0"/>
+          </a:p>
+          <a:p>
+            <a:pPr marL="742950" lvl="1" indent="-285750">
+              <a:buFont typeface="Courier New" panose="02070309020205020404" pitchFamily="49" charset="0"/>
+              <a:buChar char="o"/>
+            </a:pPr>
+            <a:r>
+              <a:rPr lang="en-US" sz="1600" dirty="0"/>
+              <a:t>SYN/UDP floods</a:t>
+            </a:r>
+          </a:p>
+          <a:p>
+            <a:pPr marL="742950" lvl="1" indent="-285750">
+              <a:buFont typeface="Courier New" panose="02070309020205020404" pitchFamily="49" charset="0"/>
+              <a:buChar char="o"/>
+            </a:pPr>
+            <a:r>
+              <a:rPr lang="en-US" sz="1600" dirty="0"/>
+              <a:t>Reflection attacks</a:t>
+            </a:r>
+          </a:p>
+          <a:p>
+            <a:pPr marL="742950" lvl="1" indent="-285750">
+              <a:buFont typeface="Courier New" panose="02070309020205020404" pitchFamily="49" charset="0"/>
+              <a:buChar char="o"/>
+            </a:pPr>
+            <a:r>
+              <a:rPr lang="en-US" sz="1600" dirty="0"/>
+              <a:t>Port exhaustion</a:t>
+            </a:r>
+          </a:p>
+          <a:p>
+            <a:pPr marL="285750" indent="-285750">
+              <a:buFont typeface="Arial" panose="020B0604020202020204" pitchFamily="34" charset="0"/>
+              <a:buChar char="•"/>
+            </a:pPr>
+            <a:r>
+              <a:rPr lang="en-US" sz="1600" dirty="0"/>
+              <a:t>Integrated with CloudFront, Route 53, and Global Accelerator</a:t>
+            </a:r>
+          </a:p>
+          <a:p>
+            <a:pPr marL="285750" indent="-285750">
+              <a:buFont typeface="Arial" panose="020B0604020202020204" pitchFamily="34" charset="0"/>
+              <a:buChar char="•"/>
+            </a:pPr>
+            <a:r>
+              <a:rPr lang="en-US" sz="1600" dirty="0"/>
+              <a:t>No setup required</a:t>
+            </a:r>
+          </a:p>
+          <a:p>
+            <a:endParaRPr lang="en-US" sz="1600" dirty="0"/>
+          </a:p>
+          <a:p>
+            <a:pPr>
+              <a:spcBef>
+                <a:spcPts val="600"/>
+              </a:spcBef>
+            </a:pPr>
+            <a:r>
+              <a:rPr lang="en-US" sz="1600" b="1" dirty="0"/>
+              <a:t>2.) Shield Advanced ($3,000/month per org) with Enhanced DDoS detection &amp; mitigation</a:t>
+            </a:r>
+            <a:endParaRPr lang="en-US" sz="1600" dirty="0"/>
+          </a:p>
+          <a:p>
+            <a:pPr marL="285750" indent="-285750">
+              <a:spcBef>
+                <a:spcPts val="600"/>
+              </a:spcBef>
+              <a:buFont typeface="Arial" panose="020B0604020202020204" pitchFamily="34" charset="0"/>
+              <a:buChar char="•"/>
+            </a:pPr>
+            <a:r>
+              <a:rPr lang="en-US" sz="1600" dirty="0"/>
+              <a:t>Protection for: CloudFront, Route 53, Global Accelerator, ALB / NLB, Elastic IPs</a:t>
+            </a:r>
+          </a:p>
+          <a:p>
+            <a:pPr marL="285750" indent="-285750">
+              <a:spcBef>
+                <a:spcPts val="600"/>
+              </a:spcBef>
+              <a:buFont typeface="Arial" panose="020B0604020202020204" pitchFamily="34" charset="0"/>
+              <a:buChar char="•"/>
+            </a:pPr>
+            <a:r>
+              <a:rPr lang="en-US" sz="1600" b="1" dirty="0"/>
+              <a:t>24/7 access to AWS DDoS Response Team (DRT)</a:t>
+            </a:r>
+            <a:endParaRPr lang="en-US" sz="1600" dirty="0"/>
+          </a:p>
+          <a:p>
+            <a:pPr marL="285750" indent="-285750">
+              <a:spcBef>
+                <a:spcPts val="600"/>
+              </a:spcBef>
+              <a:buFont typeface="Arial" panose="020B0604020202020204" pitchFamily="34" charset="0"/>
+              <a:buChar char="•"/>
+            </a:pPr>
+            <a:r>
+              <a:rPr lang="en-US" sz="1600" b="1" dirty="0"/>
+              <a:t>Cost protection</a:t>
+            </a:r>
+            <a:r>
+              <a:rPr lang="en-US" sz="1600" dirty="0"/>
+              <a:t> during DDoS attacks</a:t>
+            </a:r>
+            <a:br>
+              <a:rPr lang="en-US" sz="1600" dirty="0"/>
+            </a:br>
+            <a:r>
+              <a:rPr lang="en-US" sz="1600" dirty="0"/>
+              <a:t>(Credits for scaling costs triggered by the attack)</a:t>
+            </a:r>
+          </a:p>
+          <a:p>
+            <a:pPr marL="285750" indent="-285750">
+              <a:spcBef>
+                <a:spcPts val="600"/>
+              </a:spcBef>
+              <a:buFont typeface="Arial" panose="020B0604020202020204" pitchFamily="34" charset="0"/>
+              <a:buChar char="•"/>
+            </a:pPr>
+            <a:r>
+              <a:rPr lang="en-US" sz="1600" dirty="0"/>
+              <a:t>Detailed attack diagnostics &amp; real-time visibility</a:t>
+            </a:r>
+          </a:p>
+        </p:txBody>
+      </p:sp>
+    </p:spTree>
+  </p:cSld>
+  <p:clrMapOvr>
+    <a:masterClrMapping/>
+  </p:clrMapOvr>
+</p:sld>
+</file>
+
+<file path=ppt/slides/slide51.xml><?xml version="1.0" encoding="utf-8"?>
+<p:sld xmlns:a="http://schemas.openxmlformats.org/drawingml/2006/main" xmlns:r="http://schemas.openxmlformats.org/officeDocument/2006/relationships" xmlns:p="http://schemas.openxmlformats.org/presentationml/2006/main">
+  <p:cSld>
+    <p:spTree>
+      <p:nvGrpSpPr>
+        <p:cNvPr id="1" name=""/>
+        <p:cNvGrpSpPr/>
+        <p:nvPr/>
+      </p:nvGrpSpPr>
+      <p:grpSpPr>
+        <a:xfrm>
+          <a:off x="0" y="0"/>
+          <a:ext cx="0" cy="0"/>
+          <a:chOff x="0" y="0"/>
+          <a:chExt cx="0" cy="0"/>
+        </a:xfrm>
+      </p:grpSpPr>
+      <p:sp>
+        <p:nvSpPr>
+          <p:cNvPr id="2" name="TextBox 1"/>
+          <p:cNvSpPr txBox="1"/>
+          <p:nvPr/>
+        </p:nvSpPr>
+        <p:spPr>
+          <a:xfrm>
             <a:off x="598714" y="274321"/>
             <a:ext cx="4920634" cy="646331"/>
           </a:xfrm>
@@ -21380,7 +21497,7 @@
 </p:sld>
 </file>
 
-<file path=ppt/slides/slide51.xml><?xml version="1.0" encoding="utf-8"?>
+<file path=ppt/slides/slide52.xml><?xml version="1.0" encoding="utf-8"?>
 <p:sld xmlns:a="http://schemas.openxmlformats.org/drawingml/2006/main" xmlns:r="http://schemas.openxmlformats.org/officeDocument/2006/relationships" xmlns:p="http://schemas.openxmlformats.org/presentationml/2006/main">
   <p:cSld>
     <p:spTree>
@@ -21699,7 +21816,7 @@
 </p:sld>
 </file>
 
-<file path=ppt/slides/slide52.xml><?xml version="1.0" encoding="utf-8"?>
+<file path=ppt/slides/slide53.xml><?xml version="1.0" encoding="utf-8"?>
 <p:sld xmlns:a="http://schemas.openxmlformats.org/drawingml/2006/main" xmlns:r="http://schemas.openxmlformats.org/officeDocument/2006/relationships" xmlns:p="http://schemas.openxmlformats.org/presentationml/2006/main">
   <p:cSld>
     <p:spTree>
@@ -21724,7 +21841,7 @@
         </p:nvSpPr>
         <p:spPr>
           <a:xfrm>
-            <a:off x="816427" y="252550"/>
+            <a:off x="529344" y="252550"/>
             <a:ext cx="7598229" cy="646331"/>
           </a:xfrm>
           <a:prstGeom prst="rect">

</xml_diff>